<commit_message>
Saturation Curve almost working 100%
</commit_message>
<xml_diff>
--- a/prog_help/pac-tool help draw.pptx
+++ b/prog_help/pac-tool help draw.pptx
@@ -40,6 +40,8 @@
     <p:sldId id="281" r:id="rId34"/>
     <p:sldId id="306" r:id="rId35"/>
     <p:sldId id="284" r:id="rId36"/>
+    <p:sldId id="320" r:id="rId37"/>
+    <p:sldId id="321" r:id="rId38"/>
   </p:sldIdLst>
   <p:sldSz cx="9144000" cy="6858000" type="screen4x3"/>
   <p:notesSz cx="6858000" cy="9144000"/>
@@ -322,7 +324,7 @@
           <a:p>
             <a:fld id="{42968C2D-30BC-42AA-92C6-446775E33AE6}" type="datetimeFigureOut">
               <a:rPr lang="fr-FR" smtClean="0"/>
-              <a:t>02/01/2017</a:t>
+              <a:t>04/01/2017</a:t>
             </a:fld>
             <a:endParaRPr lang="fr-FR"/>
           </a:p>
@@ -492,7 +494,7 @@
           <a:p>
             <a:fld id="{42968C2D-30BC-42AA-92C6-446775E33AE6}" type="datetimeFigureOut">
               <a:rPr lang="fr-FR" smtClean="0"/>
-              <a:t>02/01/2017</a:t>
+              <a:t>04/01/2017</a:t>
             </a:fld>
             <a:endParaRPr lang="fr-FR"/>
           </a:p>
@@ -672,7 +674,7 @@
           <a:p>
             <a:fld id="{42968C2D-30BC-42AA-92C6-446775E33AE6}" type="datetimeFigureOut">
               <a:rPr lang="fr-FR" smtClean="0"/>
-              <a:t>02/01/2017</a:t>
+              <a:t>04/01/2017</a:t>
             </a:fld>
             <a:endParaRPr lang="fr-FR"/>
           </a:p>
@@ -842,7 +844,7 @@
           <a:p>
             <a:fld id="{42968C2D-30BC-42AA-92C6-446775E33AE6}" type="datetimeFigureOut">
               <a:rPr lang="fr-FR" smtClean="0"/>
-              <a:t>02/01/2017</a:t>
+              <a:t>04/01/2017</a:t>
             </a:fld>
             <a:endParaRPr lang="fr-FR"/>
           </a:p>
@@ -1088,7 +1090,7 @@
           <a:p>
             <a:fld id="{42968C2D-30BC-42AA-92C6-446775E33AE6}" type="datetimeFigureOut">
               <a:rPr lang="fr-FR" smtClean="0"/>
-              <a:t>02/01/2017</a:t>
+              <a:t>04/01/2017</a:t>
             </a:fld>
             <a:endParaRPr lang="fr-FR"/>
           </a:p>
@@ -1376,7 +1378,7 @@
           <a:p>
             <a:fld id="{42968C2D-30BC-42AA-92C6-446775E33AE6}" type="datetimeFigureOut">
               <a:rPr lang="fr-FR" smtClean="0"/>
-              <a:t>02/01/2017</a:t>
+              <a:t>04/01/2017</a:t>
             </a:fld>
             <a:endParaRPr lang="fr-FR"/>
           </a:p>
@@ -1798,7 +1800,7 @@
           <a:p>
             <a:fld id="{42968C2D-30BC-42AA-92C6-446775E33AE6}" type="datetimeFigureOut">
               <a:rPr lang="fr-FR" smtClean="0"/>
-              <a:t>02/01/2017</a:t>
+              <a:t>04/01/2017</a:t>
             </a:fld>
             <a:endParaRPr lang="fr-FR"/>
           </a:p>
@@ -1916,7 +1918,7 @@
           <a:p>
             <a:fld id="{42968C2D-30BC-42AA-92C6-446775E33AE6}" type="datetimeFigureOut">
               <a:rPr lang="fr-FR" smtClean="0"/>
-              <a:t>02/01/2017</a:t>
+              <a:t>04/01/2017</a:t>
             </a:fld>
             <a:endParaRPr lang="fr-FR"/>
           </a:p>
@@ -2011,7 +2013,7 @@
           <a:p>
             <a:fld id="{42968C2D-30BC-42AA-92C6-446775E33AE6}" type="datetimeFigureOut">
               <a:rPr lang="fr-FR" smtClean="0"/>
-              <a:t>02/01/2017</a:t>
+              <a:t>04/01/2017</a:t>
             </a:fld>
             <a:endParaRPr lang="fr-FR"/>
           </a:p>
@@ -2288,7 +2290,7 @@
           <a:p>
             <a:fld id="{42968C2D-30BC-42AA-92C6-446775E33AE6}" type="datetimeFigureOut">
               <a:rPr lang="fr-FR" smtClean="0"/>
-              <a:t>02/01/2017</a:t>
+              <a:t>04/01/2017</a:t>
             </a:fld>
             <a:endParaRPr lang="fr-FR"/>
           </a:p>
@@ -2541,7 +2543,7 @@
           <a:p>
             <a:fld id="{42968C2D-30BC-42AA-92C6-446775E33AE6}" type="datetimeFigureOut">
               <a:rPr lang="fr-FR" smtClean="0"/>
-              <a:t>02/01/2017</a:t>
+              <a:t>04/01/2017</a:t>
             </a:fld>
             <a:endParaRPr lang="fr-FR"/>
           </a:p>
@@ -2754,7 +2756,7 @@
           <a:p>
             <a:fld id="{42968C2D-30BC-42AA-92C6-446775E33AE6}" type="datetimeFigureOut">
               <a:rPr lang="fr-FR" smtClean="0"/>
-              <a:t>02/01/2017</a:t>
+              <a:t>04/01/2017</a:t>
             </a:fld>
             <a:endParaRPr lang="fr-FR"/>
           </a:p>
@@ -14738,11 +14740,6 @@
               </a:rPr>
               <a:t>-offset.x</a:t>
             </a:r>
-            <a:endParaRPr lang="fr-FR" b="1" dirty="0" smtClean="0">
-              <a:solidFill>
-                <a:srgbClr val="FF0000"/>
-              </a:solidFill>
-            </a:endParaRPr>
           </a:p>
           <a:p>
             <a:endParaRPr lang="fr-FR" sz="1400" dirty="0" smtClean="0"/>
@@ -15126,8 +15123,8 @@
           </a:p>
         </p:txBody>
       </p:sp>
-      <mc:AlternateContent xmlns:mc="http://schemas.openxmlformats.org/markup-compatibility/2006">
-        <mc:Choice xmlns:a14="http://schemas.microsoft.com/office/drawing/2010/main" Requires="a14">
+      <mc:AlternateContent xmlns:mc="http://schemas.openxmlformats.org/markup-compatibility/2006" xmlns:a14="http://schemas.microsoft.com/office/drawing/2010/main">
+        <mc:Choice Requires="a14">
           <p:sp>
             <p:nvSpPr>
               <p:cNvPr id="33" name="ZoneTexte 32"/>
@@ -15302,7 +15299,7 @@
             </p:txBody>
           </p:sp>
         </mc:Choice>
-        <mc:Fallback>
+        <mc:Fallback xmlns="">
           <p:sp>
             <p:nvSpPr>
               <p:cNvPr id="33" name="ZoneTexte 32"/>
@@ -16319,8 +16316,8 @@
           </a:p>
         </p:txBody>
       </p:sp>
-      <mc:AlternateContent xmlns:mc="http://schemas.openxmlformats.org/markup-compatibility/2006">
-        <mc:Choice xmlns:a14="http://schemas.microsoft.com/office/drawing/2010/main" Requires="a14">
+      <mc:AlternateContent xmlns:mc="http://schemas.openxmlformats.org/markup-compatibility/2006" xmlns:a14="http://schemas.microsoft.com/office/drawing/2010/main">
+        <mc:Choice Requires="a14">
           <p:sp>
             <p:nvSpPr>
               <p:cNvPr id="33" name="ZoneTexte 32"/>
@@ -16597,7 +16594,7 @@
                       <m:f>
                         <m:fPr>
                           <m:ctrlPr>
-                            <a:rPr lang="fr-FR" b="0" i="0" smtClean="0">
+                            <a:rPr lang="fr-FR" b="0" i="1" smtClean="0">
                               <a:solidFill>
                                 <a:srgbClr val="FF0000"/>
                               </a:solidFill>
@@ -16682,7 +16679,7 @@
             </p:txBody>
           </p:sp>
         </mc:Choice>
-        <mc:Fallback>
+        <mc:Fallback xmlns="">
           <p:sp>
             <p:nvSpPr>
               <p:cNvPr id="33" name="ZoneTexte 32"/>
@@ -16809,11 +16806,7 @@
             </a:r>
             <a:r>
               <a:rPr lang="fr-FR" sz="1400" dirty="0" smtClean="0"/>
-              <a:t>)/</a:t>
-            </a:r>
-            <a:r>
-              <a:rPr lang="fr-FR" sz="1400" dirty="0" smtClean="0"/>
-              <a:t>2+</a:t>
+              <a:t>)/2+</a:t>
             </a:r>
             <a:r>
               <a:rPr lang="fr-FR" sz="1400" b="1" dirty="0" smtClean="0">
@@ -16823,11 +16816,6 @@
               </a:rPr>
               <a:t>offset.y/100.0</a:t>
             </a:r>
-            <a:endParaRPr lang="fr-FR" sz="1400" b="1" dirty="0" smtClean="0">
-              <a:solidFill>
-                <a:srgbClr val="FF0000"/>
-              </a:solidFill>
-            </a:endParaRPr>
           </a:p>
           <a:p>
             <a:endParaRPr lang="fr-FR" sz="1400" dirty="0"/>
@@ -17635,7 +17623,6 @@
               <a:rPr lang="fr-FR" sz="9600" dirty="0" smtClean="0"/>
               <a:t>Pressure</a:t>
             </a:r>
-            <a:endParaRPr lang="fr-FR" sz="9600" dirty="0" smtClean="0"/>
           </a:p>
           <a:p>
             <a:pPr algn="ctr"/>
@@ -21666,11 +21653,19 @@
           <a:p>
             <a:r>
               <a:rPr lang="fr-FR" dirty="0" err="1" smtClean="0"/>
-              <a:t>Calul</a:t>
+              <a:t>Compute</a:t>
             </a:r>
             <a:r>
               <a:rPr lang="fr-FR" dirty="0" smtClean="0"/>
-              <a:t> de moyenne</a:t>
+              <a:t> </a:t>
+            </a:r>
+            <a:r>
+              <a:rPr lang="fr-FR" dirty="0" err="1" smtClean="0"/>
+              <a:t>mean</a:t>
+            </a:r>
+            <a:r>
+              <a:rPr lang="fr-FR" dirty="0" smtClean="0"/>
+              <a:t> value</a:t>
             </a:r>
             <a:endParaRPr lang="fr-FR" dirty="0"/>
           </a:p>
@@ -21766,6 +21761,1690 @@
     <p:extLst>
       <p:ext uri="{BB962C8B-B14F-4D97-AF65-F5344CB8AC3E}">
         <p14:creationId xmlns:p14="http://schemas.microsoft.com/office/powerpoint/2010/main" val="229610067"/>
+      </p:ext>
+    </p:extLst>
+  </p:cSld>
+  <p:clrMapOvr>
+    <a:masterClrMapping/>
+  </p:clrMapOvr>
+</p:sld>
+</file>
+
+<file path=ppt/slides/slide36.xml><?xml version="1.0" encoding="utf-8"?>
+<p:sld xmlns:a="http://schemas.openxmlformats.org/drawingml/2006/main" xmlns:r="http://schemas.openxmlformats.org/officeDocument/2006/relationships" xmlns:p="http://schemas.openxmlformats.org/presentationml/2006/main">
+  <p:cSld>
+    <p:spTree>
+      <p:nvGrpSpPr>
+        <p:cNvPr id="1" name=""/>
+        <p:cNvGrpSpPr/>
+        <p:nvPr/>
+      </p:nvGrpSpPr>
+      <p:grpSpPr>
+        <a:xfrm>
+          <a:off x="0" y="0"/>
+          <a:ext cx="0" cy="0"/>
+          <a:chOff x="0" y="0"/>
+          <a:chExt cx="0" cy="0"/>
+        </a:xfrm>
+      </p:grpSpPr>
+      <p:sp>
+        <p:nvSpPr>
+          <p:cNvPr id="2" name="Titre 1"/>
+          <p:cNvSpPr>
+            <a:spLocks noGrp="1"/>
+          </p:cNvSpPr>
+          <p:nvPr>
+            <p:ph type="ctrTitle"/>
+          </p:nvPr>
+        </p:nvSpPr>
+        <p:spPr/>
+        <p:txBody>
+          <a:bodyPr/>
+          <a:lstStyle/>
+          <a:p>
+            <a:r>
+              <a:rPr lang="fr-FR" dirty="0" err="1" smtClean="0"/>
+              <a:t>Compute</a:t>
+            </a:r>
+            <a:r>
+              <a:rPr lang="fr-FR" dirty="0" smtClean="0"/>
+              <a:t> </a:t>
+            </a:r>
+            <a:r>
+              <a:rPr lang="fr-FR" dirty="0" err="1" smtClean="0"/>
+              <a:t>Psat</a:t>
+            </a:r>
+            <a:r>
+              <a:rPr lang="fr-FR" dirty="0" smtClean="0"/>
+              <a:t> </a:t>
+            </a:r>
+            <a:r>
+              <a:rPr lang="fr-FR" dirty="0" err="1" smtClean="0"/>
+              <a:t>based</a:t>
+            </a:r>
+            <a:r>
+              <a:rPr lang="fr-FR" dirty="0" smtClean="0"/>
+              <a:t> on H</a:t>
+            </a:r>
+            <a:endParaRPr lang="fr-FR" dirty="0"/>
+          </a:p>
+        </p:txBody>
+      </p:sp>
+    </p:spTree>
+    <p:extLst>
+      <p:ext uri="{BB962C8B-B14F-4D97-AF65-F5344CB8AC3E}">
+        <p14:creationId xmlns:p14="http://schemas.microsoft.com/office/powerpoint/2010/main" val="1767589952"/>
+      </p:ext>
+    </p:extLst>
+  </p:cSld>
+  <p:clrMapOvr>
+    <a:masterClrMapping/>
+  </p:clrMapOvr>
+</p:sld>
+</file>
+
+<file path=ppt/slides/slide37.xml><?xml version="1.0" encoding="utf-8"?>
+<p:sld xmlns:a="http://schemas.openxmlformats.org/drawingml/2006/main" xmlns:r="http://schemas.openxmlformats.org/officeDocument/2006/relationships" xmlns:p="http://schemas.openxmlformats.org/presentationml/2006/main">
+  <p:cSld>
+    <p:spTree>
+      <p:nvGrpSpPr>
+        <p:cNvPr id="1" name=""/>
+        <p:cNvGrpSpPr/>
+        <p:nvPr/>
+      </p:nvGrpSpPr>
+      <p:grpSpPr>
+        <a:xfrm>
+          <a:off x="0" y="0"/>
+          <a:ext cx="0" cy="0"/>
+          <a:chOff x="0" y="0"/>
+          <a:chExt cx="0" cy="0"/>
+        </a:xfrm>
+      </p:grpSpPr>
+      <p:sp>
+        <p:nvSpPr>
+          <p:cNvPr id="5" name="Forme libre 4"/>
+          <p:cNvSpPr/>
+          <p:nvPr/>
+        </p:nvSpPr>
+        <p:spPr>
+          <a:xfrm>
+            <a:off x="2057400" y="1828800"/>
+            <a:ext cx="3578073" cy="2628900"/>
+          </a:xfrm>
+          <a:custGeom>
+            <a:avLst/>
+            <a:gdLst>
+              <a:gd name="connsiteX0" fmla="*/ 0 w 3578073"/>
+              <a:gd name="connsiteY0" fmla="*/ 1524000 h 2628900"/>
+              <a:gd name="connsiteX1" fmla="*/ 38100 w 3578073"/>
+              <a:gd name="connsiteY1" fmla="*/ 1384300 h 2628900"/>
+              <a:gd name="connsiteX2" fmla="*/ 50800 w 3578073"/>
+              <a:gd name="connsiteY2" fmla="*/ 1346200 h 2628900"/>
+              <a:gd name="connsiteX3" fmla="*/ 63500 w 3578073"/>
+              <a:gd name="connsiteY3" fmla="*/ 1308100 h 2628900"/>
+              <a:gd name="connsiteX4" fmla="*/ 88900 w 3578073"/>
+              <a:gd name="connsiteY4" fmla="*/ 1270000 h 2628900"/>
+              <a:gd name="connsiteX5" fmla="*/ 101600 w 3578073"/>
+              <a:gd name="connsiteY5" fmla="*/ 1231900 h 2628900"/>
+              <a:gd name="connsiteX6" fmla="*/ 139700 w 3578073"/>
+              <a:gd name="connsiteY6" fmla="*/ 1193800 h 2628900"/>
+              <a:gd name="connsiteX7" fmla="*/ 190500 w 3578073"/>
+              <a:gd name="connsiteY7" fmla="*/ 1117600 h 2628900"/>
+              <a:gd name="connsiteX8" fmla="*/ 215900 w 3578073"/>
+              <a:gd name="connsiteY8" fmla="*/ 1079500 h 2628900"/>
+              <a:gd name="connsiteX9" fmla="*/ 292100 w 3578073"/>
+              <a:gd name="connsiteY9" fmla="*/ 1016000 h 2628900"/>
+              <a:gd name="connsiteX10" fmla="*/ 330200 w 3578073"/>
+              <a:gd name="connsiteY10" fmla="*/ 990600 h 2628900"/>
+              <a:gd name="connsiteX11" fmla="*/ 368300 w 3578073"/>
+              <a:gd name="connsiteY11" fmla="*/ 952500 h 2628900"/>
+              <a:gd name="connsiteX12" fmla="*/ 482600 w 3578073"/>
+              <a:gd name="connsiteY12" fmla="*/ 889000 h 2628900"/>
+              <a:gd name="connsiteX13" fmla="*/ 596900 w 3578073"/>
+              <a:gd name="connsiteY13" fmla="*/ 825500 h 2628900"/>
+              <a:gd name="connsiteX14" fmla="*/ 711200 w 3578073"/>
+              <a:gd name="connsiteY14" fmla="*/ 762000 h 2628900"/>
+              <a:gd name="connsiteX15" fmla="*/ 825500 w 3578073"/>
+              <a:gd name="connsiteY15" fmla="*/ 685800 h 2628900"/>
+              <a:gd name="connsiteX16" fmla="*/ 901700 w 3578073"/>
+              <a:gd name="connsiteY16" fmla="*/ 635000 h 2628900"/>
+              <a:gd name="connsiteX17" fmla="*/ 965200 w 3578073"/>
+              <a:gd name="connsiteY17" fmla="*/ 584200 h 2628900"/>
+              <a:gd name="connsiteX18" fmla="*/ 990600 w 3578073"/>
+              <a:gd name="connsiteY18" fmla="*/ 546100 h 2628900"/>
+              <a:gd name="connsiteX19" fmla="*/ 1028700 w 3578073"/>
+              <a:gd name="connsiteY19" fmla="*/ 520700 h 2628900"/>
+              <a:gd name="connsiteX20" fmla="*/ 1104900 w 3578073"/>
+              <a:gd name="connsiteY20" fmla="*/ 457200 h 2628900"/>
+              <a:gd name="connsiteX21" fmla="*/ 1155700 w 3578073"/>
+              <a:gd name="connsiteY21" fmla="*/ 419100 h 2628900"/>
+              <a:gd name="connsiteX22" fmla="*/ 1206500 w 3578073"/>
+              <a:gd name="connsiteY22" fmla="*/ 406400 h 2628900"/>
+              <a:gd name="connsiteX23" fmla="*/ 1295400 w 3578073"/>
+              <a:gd name="connsiteY23" fmla="*/ 368300 h 2628900"/>
+              <a:gd name="connsiteX24" fmla="*/ 1333500 w 3578073"/>
+              <a:gd name="connsiteY24" fmla="*/ 342900 h 2628900"/>
+              <a:gd name="connsiteX25" fmla="*/ 1409700 w 3578073"/>
+              <a:gd name="connsiteY25" fmla="*/ 317500 h 2628900"/>
+              <a:gd name="connsiteX26" fmla="*/ 1460500 w 3578073"/>
+              <a:gd name="connsiteY26" fmla="*/ 292100 h 2628900"/>
+              <a:gd name="connsiteX27" fmla="*/ 1536700 w 3578073"/>
+              <a:gd name="connsiteY27" fmla="*/ 279400 h 2628900"/>
+              <a:gd name="connsiteX28" fmla="*/ 1612900 w 3578073"/>
+              <a:gd name="connsiteY28" fmla="*/ 254000 h 2628900"/>
+              <a:gd name="connsiteX29" fmla="*/ 1651000 w 3578073"/>
+              <a:gd name="connsiteY29" fmla="*/ 241300 h 2628900"/>
+              <a:gd name="connsiteX30" fmla="*/ 1739900 w 3578073"/>
+              <a:gd name="connsiteY30" fmla="*/ 190500 h 2628900"/>
+              <a:gd name="connsiteX31" fmla="*/ 1790700 w 3578073"/>
+              <a:gd name="connsiteY31" fmla="*/ 177800 h 2628900"/>
+              <a:gd name="connsiteX32" fmla="*/ 1828800 w 3578073"/>
+              <a:gd name="connsiteY32" fmla="*/ 165100 h 2628900"/>
+              <a:gd name="connsiteX33" fmla="*/ 1892300 w 3578073"/>
+              <a:gd name="connsiteY33" fmla="*/ 152400 h 2628900"/>
+              <a:gd name="connsiteX34" fmla="*/ 1968500 w 3578073"/>
+              <a:gd name="connsiteY34" fmla="*/ 127000 h 2628900"/>
+              <a:gd name="connsiteX35" fmla="*/ 2019300 w 3578073"/>
+              <a:gd name="connsiteY35" fmla="*/ 114300 h 2628900"/>
+              <a:gd name="connsiteX36" fmla="*/ 2095500 w 3578073"/>
+              <a:gd name="connsiteY36" fmla="*/ 88900 h 2628900"/>
+              <a:gd name="connsiteX37" fmla="*/ 2273300 w 3578073"/>
+              <a:gd name="connsiteY37" fmla="*/ 50800 h 2628900"/>
+              <a:gd name="connsiteX38" fmla="*/ 2324100 w 3578073"/>
+              <a:gd name="connsiteY38" fmla="*/ 25400 h 2628900"/>
+              <a:gd name="connsiteX39" fmla="*/ 2413000 w 3578073"/>
+              <a:gd name="connsiteY39" fmla="*/ 12700 h 2628900"/>
+              <a:gd name="connsiteX40" fmla="*/ 2451100 w 3578073"/>
+              <a:gd name="connsiteY40" fmla="*/ 0 h 2628900"/>
+              <a:gd name="connsiteX41" fmla="*/ 2692400 w 3578073"/>
+              <a:gd name="connsiteY41" fmla="*/ 12700 h 2628900"/>
+              <a:gd name="connsiteX42" fmla="*/ 2768600 w 3578073"/>
+              <a:gd name="connsiteY42" fmla="*/ 50800 h 2628900"/>
+              <a:gd name="connsiteX43" fmla="*/ 2806700 w 3578073"/>
+              <a:gd name="connsiteY43" fmla="*/ 63500 h 2628900"/>
+              <a:gd name="connsiteX44" fmla="*/ 3022600 w 3578073"/>
+              <a:gd name="connsiteY44" fmla="*/ 88900 h 2628900"/>
+              <a:gd name="connsiteX45" fmla="*/ 3060700 w 3578073"/>
+              <a:gd name="connsiteY45" fmla="*/ 101600 h 2628900"/>
+              <a:gd name="connsiteX46" fmla="*/ 3175000 w 3578073"/>
+              <a:gd name="connsiteY46" fmla="*/ 165100 h 2628900"/>
+              <a:gd name="connsiteX47" fmla="*/ 3213100 w 3578073"/>
+              <a:gd name="connsiteY47" fmla="*/ 203200 h 2628900"/>
+              <a:gd name="connsiteX48" fmla="*/ 3289300 w 3578073"/>
+              <a:gd name="connsiteY48" fmla="*/ 254000 h 2628900"/>
+              <a:gd name="connsiteX49" fmla="*/ 3352800 w 3578073"/>
+              <a:gd name="connsiteY49" fmla="*/ 317500 h 2628900"/>
+              <a:gd name="connsiteX50" fmla="*/ 3429000 w 3578073"/>
+              <a:gd name="connsiteY50" fmla="*/ 381000 h 2628900"/>
+              <a:gd name="connsiteX51" fmla="*/ 3492500 w 3578073"/>
+              <a:gd name="connsiteY51" fmla="*/ 457200 h 2628900"/>
+              <a:gd name="connsiteX52" fmla="*/ 3556000 w 3578073"/>
+              <a:gd name="connsiteY52" fmla="*/ 533400 h 2628900"/>
+              <a:gd name="connsiteX53" fmla="*/ 3556000 w 3578073"/>
+              <a:gd name="connsiteY53" fmla="*/ 787400 h 2628900"/>
+              <a:gd name="connsiteX54" fmla="*/ 3530600 w 3578073"/>
+              <a:gd name="connsiteY54" fmla="*/ 863600 h 2628900"/>
+              <a:gd name="connsiteX55" fmla="*/ 3492500 w 3578073"/>
+              <a:gd name="connsiteY55" fmla="*/ 977900 h 2628900"/>
+              <a:gd name="connsiteX56" fmla="*/ 3467100 w 3578073"/>
+              <a:gd name="connsiteY56" fmla="*/ 1016000 h 2628900"/>
+              <a:gd name="connsiteX57" fmla="*/ 3441700 w 3578073"/>
+              <a:gd name="connsiteY57" fmla="*/ 1092200 h 2628900"/>
+              <a:gd name="connsiteX58" fmla="*/ 3416300 w 3578073"/>
+              <a:gd name="connsiteY58" fmla="*/ 1130300 h 2628900"/>
+              <a:gd name="connsiteX59" fmla="*/ 3390900 w 3578073"/>
+              <a:gd name="connsiteY59" fmla="*/ 1206500 h 2628900"/>
+              <a:gd name="connsiteX60" fmla="*/ 3365500 w 3578073"/>
+              <a:gd name="connsiteY60" fmla="*/ 1295400 h 2628900"/>
+              <a:gd name="connsiteX61" fmla="*/ 3327400 w 3578073"/>
+              <a:gd name="connsiteY61" fmla="*/ 1447800 h 2628900"/>
+              <a:gd name="connsiteX62" fmla="*/ 3302000 w 3578073"/>
+              <a:gd name="connsiteY62" fmla="*/ 1485900 h 2628900"/>
+              <a:gd name="connsiteX63" fmla="*/ 3225800 w 3578073"/>
+              <a:gd name="connsiteY63" fmla="*/ 1562100 h 2628900"/>
+              <a:gd name="connsiteX64" fmla="*/ 3162300 w 3578073"/>
+              <a:gd name="connsiteY64" fmla="*/ 1625600 h 2628900"/>
+              <a:gd name="connsiteX65" fmla="*/ 3111500 w 3578073"/>
+              <a:gd name="connsiteY65" fmla="*/ 1701800 h 2628900"/>
+              <a:gd name="connsiteX66" fmla="*/ 3098800 w 3578073"/>
+              <a:gd name="connsiteY66" fmla="*/ 1739900 h 2628900"/>
+              <a:gd name="connsiteX67" fmla="*/ 3060700 w 3578073"/>
+              <a:gd name="connsiteY67" fmla="*/ 1778000 h 2628900"/>
+              <a:gd name="connsiteX68" fmla="*/ 3009900 w 3578073"/>
+              <a:gd name="connsiteY68" fmla="*/ 1854200 h 2628900"/>
+              <a:gd name="connsiteX69" fmla="*/ 2971800 w 3578073"/>
+              <a:gd name="connsiteY69" fmla="*/ 1879600 h 2628900"/>
+              <a:gd name="connsiteX70" fmla="*/ 2895600 w 3578073"/>
+              <a:gd name="connsiteY70" fmla="*/ 1955800 h 2628900"/>
+              <a:gd name="connsiteX71" fmla="*/ 2844800 w 3578073"/>
+              <a:gd name="connsiteY71" fmla="*/ 2032000 h 2628900"/>
+              <a:gd name="connsiteX72" fmla="*/ 2794000 w 3578073"/>
+              <a:gd name="connsiteY72" fmla="*/ 2108200 h 2628900"/>
+              <a:gd name="connsiteX73" fmla="*/ 2768600 w 3578073"/>
+              <a:gd name="connsiteY73" fmla="*/ 2146300 h 2628900"/>
+              <a:gd name="connsiteX74" fmla="*/ 2730500 w 3578073"/>
+              <a:gd name="connsiteY74" fmla="*/ 2184400 h 2628900"/>
+              <a:gd name="connsiteX75" fmla="*/ 2667000 w 3578073"/>
+              <a:gd name="connsiteY75" fmla="*/ 2298700 h 2628900"/>
+              <a:gd name="connsiteX76" fmla="*/ 2641600 w 3578073"/>
+              <a:gd name="connsiteY76" fmla="*/ 2336800 h 2628900"/>
+              <a:gd name="connsiteX77" fmla="*/ 2578100 w 3578073"/>
+              <a:gd name="connsiteY77" fmla="*/ 2527300 h 2628900"/>
+              <a:gd name="connsiteX78" fmla="*/ 2552700 w 3578073"/>
+              <a:gd name="connsiteY78" fmla="*/ 2616200 h 2628900"/>
+              <a:gd name="connsiteX79" fmla="*/ 2540000 w 3578073"/>
+              <a:gd name="connsiteY79" fmla="*/ 2628900 h 2628900"/>
+            </a:gdLst>
+            <a:ahLst/>
+            <a:cxnLst>
+              <a:cxn ang="0">
+                <a:pos x="connsiteX0" y="connsiteY0"/>
+              </a:cxn>
+              <a:cxn ang="0">
+                <a:pos x="connsiteX1" y="connsiteY1"/>
+              </a:cxn>
+              <a:cxn ang="0">
+                <a:pos x="connsiteX2" y="connsiteY2"/>
+              </a:cxn>
+              <a:cxn ang="0">
+                <a:pos x="connsiteX3" y="connsiteY3"/>
+              </a:cxn>
+              <a:cxn ang="0">
+                <a:pos x="connsiteX4" y="connsiteY4"/>
+              </a:cxn>
+              <a:cxn ang="0">
+                <a:pos x="connsiteX5" y="connsiteY5"/>
+              </a:cxn>
+              <a:cxn ang="0">
+                <a:pos x="connsiteX6" y="connsiteY6"/>
+              </a:cxn>
+              <a:cxn ang="0">
+                <a:pos x="connsiteX7" y="connsiteY7"/>
+              </a:cxn>
+              <a:cxn ang="0">
+                <a:pos x="connsiteX8" y="connsiteY8"/>
+              </a:cxn>
+              <a:cxn ang="0">
+                <a:pos x="connsiteX9" y="connsiteY9"/>
+              </a:cxn>
+              <a:cxn ang="0">
+                <a:pos x="connsiteX10" y="connsiteY10"/>
+              </a:cxn>
+              <a:cxn ang="0">
+                <a:pos x="connsiteX11" y="connsiteY11"/>
+              </a:cxn>
+              <a:cxn ang="0">
+                <a:pos x="connsiteX12" y="connsiteY12"/>
+              </a:cxn>
+              <a:cxn ang="0">
+                <a:pos x="connsiteX13" y="connsiteY13"/>
+              </a:cxn>
+              <a:cxn ang="0">
+                <a:pos x="connsiteX14" y="connsiteY14"/>
+              </a:cxn>
+              <a:cxn ang="0">
+                <a:pos x="connsiteX15" y="connsiteY15"/>
+              </a:cxn>
+              <a:cxn ang="0">
+                <a:pos x="connsiteX16" y="connsiteY16"/>
+              </a:cxn>
+              <a:cxn ang="0">
+                <a:pos x="connsiteX17" y="connsiteY17"/>
+              </a:cxn>
+              <a:cxn ang="0">
+                <a:pos x="connsiteX18" y="connsiteY18"/>
+              </a:cxn>
+              <a:cxn ang="0">
+                <a:pos x="connsiteX19" y="connsiteY19"/>
+              </a:cxn>
+              <a:cxn ang="0">
+                <a:pos x="connsiteX20" y="connsiteY20"/>
+              </a:cxn>
+              <a:cxn ang="0">
+                <a:pos x="connsiteX21" y="connsiteY21"/>
+              </a:cxn>
+              <a:cxn ang="0">
+                <a:pos x="connsiteX22" y="connsiteY22"/>
+              </a:cxn>
+              <a:cxn ang="0">
+                <a:pos x="connsiteX23" y="connsiteY23"/>
+              </a:cxn>
+              <a:cxn ang="0">
+                <a:pos x="connsiteX24" y="connsiteY24"/>
+              </a:cxn>
+              <a:cxn ang="0">
+                <a:pos x="connsiteX25" y="connsiteY25"/>
+              </a:cxn>
+              <a:cxn ang="0">
+                <a:pos x="connsiteX26" y="connsiteY26"/>
+              </a:cxn>
+              <a:cxn ang="0">
+                <a:pos x="connsiteX27" y="connsiteY27"/>
+              </a:cxn>
+              <a:cxn ang="0">
+                <a:pos x="connsiteX28" y="connsiteY28"/>
+              </a:cxn>
+              <a:cxn ang="0">
+                <a:pos x="connsiteX29" y="connsiteY29"/>
+              </a:cxn>
+              <a:cxn ang="0">
+                <a:pos x="connsiteX30" y="connsiteY30"/>
+              </a:cxn>
+              <a:cxn ang="0">
+                <a:pos x="connsiteX31" y="connsiteY31"/>
+              </a:cxn>
+              <a:cxn ang="0">
+                <a:pos x="connsiteX32" y="connsiteY32"/>
+              </a:cxn>
+              <a:cxn ang="0">
+                <a:pos x="connsiteX33" y="connsiteY33"/>
+              </a:cxn>
+              <a:cxn ang="0">
+                <a:pos x="connsiteX34" y="connsiteY34"/>
+              </a:cxn>
+              <a:cxn ang="0">
+                <a:pos x="connsiteX35" y="connsiteY35"/>
+              </a:cxn>
+              <a:cxn ang="0">
+                <a:pos x="connsiteX36" y="connsiteY36"/>
+              </a:cxn>
+              <a:cxn ang="0">
+                <a:pos x="connsiteX37" y="connsiteY37"/>
+              </a:cxn>
+              <a:cxn ang="0">
+                <a:pos x="connsiteX38" y="connsiteY38"/>
+              </a:cxn>
+              <a:cxn ang="0">
+                <a:pos x="connsiteX39" y="connsiteY39"/>
+              </a:cxn>
+              <a:cxn ang="0">
+                <a:pos x="connsiteX40" y="connsiteY40"/>
+              </a:cxn>
+              <a:cxn ang="0">
+                <a:pos x="connsiteX41" y="connsiteY41"/>
+              </a:cxn>
+              <a:cxn ang="0">
+                <a:pos x="connsiteX42" y="connsiteY42"/>
+              </a:cxn>
+              <a:cxn ang="0">
+                <a:pos x="connsiteX43" y="connsiteY43"/>
+              </a:cxn>
+              <a:cxn ang="0">
+                <a:pos x="connsiteX44" y="connsiteY44"/>
+              </a:cxn>
+              <a:cxn ang="0">
+                <a:pos x="connsiteX45" y="connsiteY45"/>
+              </a:cxn>
+              <a:cxn ang="0">
+                <a:pos x="connsiteX46" y="connsiteY46"/>
+              </a:cxn>
+              <a:cxn ang="0">
+                <a:pos x="connsiteX47" y="connsiteY47"/>
+              </a:cxn>
+              <a:cxn ang="0">
+                <a:pos x="connsiteX48" y="connsiteY48"/>
+              </a:cxn>
+              <a:cxn ang="0">
+                <a:pos x="connsiteX49" y="connsiteY49"/>
+              </a:cxn>
+              <a:cxn ang="0">
+                <a:pos x="connsiteX50" y="connsiteY50"/>
+              </a:cxn>
+              <a:cxn ang="0">
+                <a:pos x="connsiteX51" y="connsiteY51"/>
+              </a:cxn>
+              <a:cxn ang="0">
+                <a:pos x="connsiteX52" y="connsiteY52"/>
+              </a:cxn>
+              <a:cxn ang="0">
+                <a:pos x="connsiteX53" y="connsiteY53"/>
+              </a:cxn>
+              <a:cxn ang="0">
+                <a:pos x="connsiteX54" y="connsiteY54"/>
+              </a:cxn>
+              <a:cxn ang="0">
+                <a:pos x="connsiteX55" y="connsiteY55"/>
+              </a:cxn>
+              <a:cxn ang="0">
+                <a:pos x="connsiteX56" y="connsiteY56"/>
+              </a:cxn>
+              <a:cxn ang="0">
+                <a:pos x="connsiteX57" y="connsiteY57"/>
+              </a:cxn>
+              <a:cxn ang="0">
+                <a:pos x="connsiteX58" y="connsiteY58"/>
+              </a:cxn>
+              <a:cxn ang="0">
+                <a:pos x="connsiteX59" y="connsiteY59"/>
+              </a:cxn>
+              <a:cxn ang="0">
+                <a:pos x="connsiteX60" y="connsiteY60"/>
+              </a:cxn>
+              <a:cxn ang="0">
+                <a:pos x="connsiteX61" y="connsiteY61"/>
+              </a:cxn>
+              <a:cxn ang="0">
+                <a:pos x="connsiteX62" y="connsiteY62"/>
+              </a:cxn>
+              <a:cxn ang="0">
+                <a:pos x="connsiteX63" y="connsiteY63"/>
+              </a:cxn>
+              <a:cxn ang="0">
+                <a:pos x="connsiteX64" y="connsiteY64"/>
+              </a:cxn>
+              <a:cxn ang="0">
+                <a:pos x="connsiteX65" y="connsiteY65"/>
+              </a:cxn>
+              <a:cxn ang="0">
+                <a:pos x="connsiteX66" y="connsiteY66"/>
+              </a:cxn>
+              <a:cxn ang="0">
+                <a:pos x="connsiteX67" y="connsiteY67"/>
+              </a:cxn>
+              <a:cxn ang="0">
+                <a:pos x="connsiteX68" y="connsiteY68"/>
+              </a:cxn>
+              <a:cxn ang="0">
+                <a:pos x="connsiteX69" y="connsiteY69"/>
+              </a:cxn>
+              <a:cxn ang="0">
+                <a:pos x="connsiteX70" y="connsiteY70"/>
+              </a:cxn>
+              <a:cxn ang="0">
+                <a:pos x="connsiteX71" y="connsiteY71"/>
+              </a:cxn>
+              <a:cxn ang="0">
+                <a:pos x="connsiteX72" y="connsiteY72"/>
+              </a:cxn>
+              <a:cxn ang="0">
+                <a:pos x="connsiteX73" y="connsiteY73"/>
+              </a:cxn>
+              <a:cxn ang="0">
+                <a:pos x="connsiteX74" y="connsiteY74"/>
+              </a:cxn>
+              <a:cxn ang="0">
+                <a:pos x="connsiteX75" y="connsiteY75"/>
+              </a:cxn>
+              <a:cxn ang="0">
+                <a:pos x="connsiteX76" y="connsiteY76"/>
+              </a:cxn>
+              <a:cxn ang="0">
+                <a:pos x="connsiteX77" y="connsiteY77"/>
+              </a:cxn>
+              <a:cxn ang="0">
+                <a:pos x="connsiteX78" y="connsiteY78"/>
+              </a:cxn>
+              <a:cxn ang="0">
+                <a:pos x="connsiteX79" y="connsiteY79"/>
+              </a:cxn>
+            </a:cxnLst>
+            <a:rect l="l" t="t" r="r" b="b"/>
+            <a:pathLst>
+              <a:path w="3578073" h="2628900">
+                <a:moveTo>
+                  <a:pt x="0" y="1524000"/>
+                </a:moveTo>
+                <a:cubicBezTo>
+                  <a:pt x="17951" y="1434246"/>
+                  <a:pt x="5874" y="1480978"/>
+                  <a:pt x="38100" y="1384300"/>
+                </a:cubicBezTo>
+                <a:lnTo>
+                  <a:pt x="50800" y="1346200"/>
+                </a:lnTo>
+                <a:cubicBezTo>
+                  <a:pt x="55033" y="1333500"/>
+                  <a:pt x="56074" y="1319239"/>
+                  <a:pt x="63500" y="1308100"/>
+                </a:cubicBezTo>
+                <a:cubicBezTo>
+                  <a:pt x="71967" y="1295400"/>
+                  <a:pt x="82074" y="1283652"/>
+                  <a:pt x="88900" y="1270000"/>
+                </a:cubicBezTo>
+                <a:cubicBezTo>
+                  <a:pt x="94887" y="1258026"/>
+                  <a:pt x="94174" y="1243039"/>
+                  <a:pt x="101600" y="1231900"/>
+                </a:cubicBezTo>
+                <a:cubicBezTo>
+                  <a:pt x="111563" y="1216956"/>
+                  <a:pt x="128673" y="1207977"/>
+                  <a:pt x="139700" y="1193800"/>
+                </a:cubicBezTo>
+                <a:cubicBezTo>
+                  <a:pt x="158442" y="1169703"/>
+                  <a:pt x="173567" y="1143000"/>
+                  <a:pt x="190500" y="1117600"/>
+                </a:cubicBezTo>
+                <a:cubicBezTo>
+                  <a:pt x="198967" y="1104900"/>
+                  <a:pt x="203200" y="1087967"/>
+                  <a:pt x="215900" y="1079500"/>
+                </a:cubicBezTo>
+                <a:cubicBezTo>
+                  <a:pt x="310495" y="1016437"/>
+                  <a:pt x="194314" y="1097488"/>
+                  <a:pt x="292100" y="1016000"/>
+                </a:cubicBezTo>
+                <a:cubicBezTo>
+                  <a:pt x="303826" y="1006229"/>
+                  <a:pt x="318474" y="1000371"/>
+                  <a:pt x="330200" y="990600"/>
+                </a:cubicBezTo>
+                <a:cubicBezTo>
+                  <a:pt x="343998" y="979102"/>
+                  <a:pt x="354123" y="963527"/>
+                  <a:pt x="368300" y="952500"/>
+                </a:cubicBezTo>
+                <a:cubicBezTo>
+                  <a:pt x="433804" y="901552"/>
+                  <a:pt x="425115" y="908162"/>
+                  <a:pt x="482600" y="889000"/>
+                </a:cubicBezTo>
+                <a:cubicBezTo>
+                  <a:pt x="569939" y="830774"/>
+                  <a:pt x="529840" y="847853"/>
+                  <a:pt x="596900" y="825500"/>
+                </a:cubicBezTo>
+                <a:cubicBezTo>
+                  <a:pt x="684239" y="767274"/>
+                  <a:pt x="644140" y="784353"/>
+                  <a:pt x="711200" y="762000"/>
+                </a:cubicBezTo>
+                <a:lnTo>
+                  <a:pt x="825500" y="685800"/>
+                </a:lnTo>
+                <a:cubicBezTo>
+                  <a:pt x="920632" y="622379"/>
+                  <a:pt x="811108" y="665197"/>
+                  <a:pt x="901700" y="635000"/>
+                </a:cubicBezTo>
+                <a:cubicBezTo>
+                  <a:pt x="974493" y="525811"/>
+                  <a:pt x="877566" y="654307"/>
+                  <a:pt x="965200" y="584200"/>
+                </a:cubicBezTo>
+                <a:cubicBezTo>
+                  <a:pt x="977119" y="574665"/>
+                  <a:pt x="979807" y="556893"/>
+                  <a:pt x="990600" y="546100"/>
+                </a:cubicBezTo>
+                <a:cubicBezTo>
+                  <a:pt x="1001393" y="535307"/>
+                  <a:pt x="1016974" y="530471"/>
+                  <a:pt x="1028700" y="520700"/>
+                </a:cubicBezTo>
+                <a:cubicBezTo>
+                  <a:pt x="1171010" y="402109"/>
+                  <a:pt x="972467" y="551795"/>
+                  <a:pt x="1104900" y="457200"/>
+                </a:cubicBezTo>
+                <a:cubicBezTo>
+                  <a:pt x="1122124" y="444897"/>
+                  <a:pt x="1136768" y="428566"/>
+                  <a:pt x="1155700" y="419100"/>
+                </a:cubicBezTo>
+                <a:cubicBezTo>
+                  <a:pt x="1171312" y="411294"/>
+                  <a:pt x="1189567" y="410633"/>
+                  <a:pt x="1206500" y="406400"/>
+                </a:cubicBezTo>
+                <a:cubicBezTo>
+                  <a:pt x="1302152" y="342632"/>
+                  <a:pt x="1180586" y="417506"/>
+                  <a:pt x="1295400" y="368300"/>
+                </a:cubicBezTo>
+                <a:cubicBezTo>
+                  <a:pt x="1309429" y="362287"/>
+                  <a:pt x="1319552" y="349099"/>
+                  <a:pt x="1333500" y="342900"/>
+                </a:cubicBezTo>
+                <a:cubicBezTo>
+                  <a:pt x="1357966" y="332026"/>
+                  <a:pt x="1385753" y="329474"/>
+                  <a:pt x="1409700" y="317500"/>
+                </a:cubicBezTo>
+                <a:cubicBezTo>
+                  <a:pt x="1426633" y="309033"/>
+                  <a:pt x="1442366" y="297540"/>
+                  <a:pt x="1460500" y="292100"/>
+                </a:cubicBezTo>
+                <a:cubicBezTo>
+                  <a:pt x="1485164" y="284701"/>
+                  <a:pt x="1511300" y="283633"/>
+                  <a:pt x="1536700" y="279400"/>
+                </a:cubicBezTo>
+                <a:lnTo>
+                  <a:pt x="1612900" y="254000"/>
+                </a:lnTo>
+                <a:lnTo>
+                  <a:pt x="1651000" y="241300"/>
+                </a:lnTo>
+                <a:cubicBezTo>
+                  <a:pt x="1682583" y="220245"/>
+                  <a:pt x="1703070" y="204311"/>
+                  <a:pt x="1739900" y="190500"/>
+                </a:cubicBezTo>
+                <a:cubicBezTo>
+                  <a:pt x="1756243" y="184371"/>
+                  <a:pt x="1773917" y="182595"/>
+                  <a:pt x="1790700" y="177800"/>
+                </a:cubicBezTo>
+                <a:cubicBezTo>
+                  <a:pt x="1803572" y="174122"/>
+                  <a:pt x="1815813" y="168347"/>
+                  <a:pt x="1828800" y="165100"/>
+                </a:cubicBezTo>
+                <a:cubicBezTo>
+                  <a:pt x="1849741" y="159865"/>
+                  <a:pt x="1871475" y="158080"/>
+                  <a:pt x="1892300" y="152400"/>
+                </a:cubicBezTo>
+                <a:cubicBezTo>
+                  <a:pt x="1918131" y="145355"/>
+                  <a:pt x="1942525" y="133494"/>
+                  <a:pt x="1968500" y="127000"/>
+                </a:cubicBezTo>
+                <a:cubicBezTo>
+                  <a:pt x="1985433" y="122767"/>
+                  <a:pt x="2002582" y="119316"/>
+                  <a:pt x="2019300" y="114300"/>
+                </a:cubicBezTo>
+                <a:cubicBezTo>
+                  <a:pt x="2044945" y="106607"/>
+                  <a:pt x="2069525" y="95394"/>
+                  <a:pt x="2095500" y="88900"/>
+                </a:cubicBezTo>
+                <a:cubicBezTo>
+                  <a:pt x="2222082" y="57255"/>
+                  <a:pt x="2162666" y="69239"/>
+                  <a:pt x="2273300" y="50800"/>
+                </a:cubicBezTo>
+                <a:cubicBezTo>
+                  <a:pt x="2290233" y="42333"/>
+                  <a:pt x="2305835" y="30381"/>
+                  <a:pt x="2324100" y="25400"/>
+                </a:cubicBezTo>
+                <a:cubicBezTo>
+                  <a:pt x="2352979" y="17524"/>
+                  <a:pt x="2383647" y="18571"/>
+                  <a:pt x="2413000" y="12700"/>
+                </a:cubicBezTo>
+                <a:cubicBezTo>
+                  <a:pt x="2426127" y="10075"/>
+                  <a:pt x="2438400" y="4233"/>
+                  <a:pt x="2451100" y="0"/>
+                </a:cubicBezTo>
+                <a:cubicBezTo>
+                  <a:pt x="2531533" y="4233"/>
+                  <a:pt x="2612186" y="5408"/>
+                  <a:pt x="2692400" y="12700"/>
+                </a:cubicBezTo>
+                <a:cubicBezTo>
+                  <a:pt x="2731416" y="16247"/>
+                  <a:pt x="2734828" y="33914"/>
+                  <a:pt x="2768600" y="50800"/>
+                </a:cubicBezTo>
+                <a:cubicBezTo>
+                  <a:pt x="2780574" y="56787"/>
+                  <a:pt x="2793632" y="60596"/>
+                  <a:pt x="2806700" y="63500"/>
+                </a:cubicBezTo>
+                <a:cubicBezTo>
+                  <a:pt x="2877271" y="79182"/>
+                  <a:pt x="2951229" y="82412"/>
+                  <a:pt x="3022600" y="88900"/>
+                </a:cubicBezTo>
+                <a:cubicBezTo>
+                  <a:pt x="3035300" y="93133"/>
+                  <a:pt x="3048998" y="95099"/>
+                  <a:pt x="3060700" y="101600"/>
+                </a:cubicBezTo>
+                <a:cubicBezTo>
+                  <a:pt x="3191708" y="174382"/>
+                  <a:pt x="3088789" y="136363"/>
+                  <a:pt x="3175000" y="165100"/>
+                </a:cubicBezTo>
+                <a:cubicBezTo>
+                  <a:pt x="3187700" y="177800"/>
+                  <a:pt x="3198923" y="192173"/>
+                  <a:pt x="3213100" y="203200"/>
+                </a:cubicBezTo>
+                <a:cubicBezTo>
+                  <a:pt x="3237197" y="221942"/>
+                  <a:pt x="3289300" y="254000"/>
+                  <a:pt x="3289300" y="254000"/>
+                </a:cubicBezTo>
+                <a:cubicBezTo>
+                  <a:pt x="3335867" y="323850"/>
+                  <a:pt x="3289300" y="264583"/>
+                  <a:pt x="3352800" y="317500"/>
+                </a:cubicBezTo>
+                <a:cubicBezTo>
+                  <a:pt x="3450586" y="398988"/>
+                  <a:pt x="3334405" y="317937"/>
+                  <a:pt x="3429000" y="381000"/>
+                </a:cubicBezTo>
+                <a:cubicBezTo>
+                  <a:pt x="3492063" y="475595"/>
+                  <a:pt x="3411012" y="359414"/>
+                  <a:pt x="3492500" y="457200"/>
+                </a:cubicBezTo>
+                <a:cubicBezTo>
+                  <a:pt x="3580907" y="563288"/>
+                  <a:pt x="3444690" y="422090"/>
+                  <a:pt x="3556000" y="533400"/>
+                </a:cubicBezTo>
+                <a:cubicBezTo>
+                  <a:pt x="3589306" y="633318"/>
+                  <a:pt x="3581286" y="593537"/>
+                  <a:pt x="3556000" y="787400"/>
+                </a:cubicBezTo>
+                <a:cubicBezTo>
+                  <a:pt x="3552537" y="813949"/>
+                  <a:pt x="3539067" y="838200"/>
+                  <a:pt x="3530600" y="863600"/>
+                </a:cubicBezTo>
+                <a:lnTo>
+                  <a:pt x="3492500" y="977900"/>
+                </a:lnTo>
+                <a:cubicBezTo>
+                  <a:pt x="3487673" y="992380"/>
+                  <a:pt x="3473299" y="1002052"/>
+                  <a:pt x="3467100" y="1016000"/>
+                </a:cubicBezTo>
+                <a:cubicBezTo>
+                  <a:pt x="3456226" y="1040466"/>
+                  <a:pt x="3450167" y="1066800"/>
+                  <a:pt x="3441700" y="1092200"/>
+                </a:cubicBezTo>
+                <a:cubicBezTo>
+                  <a:pt x="3436873" y="1106680"/>
+                  <a:pt x="3422499" y="1116352"/>
+                  <a:pt x="3416300" y="1130300"/>
+                </a:cubicBezTo>
+                <a:cubicBezTo>
+                  <a:pt x="3405426" y="1154766"/>
+                  <a:pt x="3399367" y="1181100"/>
+                  <a:pt x="3390900" y="1206500"/>
+                </a:cubicBezTo>
+                <a:cubicBezTo>
+                  <a:pt x="3378796" y="1242813"/>
+                  <a:pt x="3373473" y="1255533"/>
+                  <a:pt x="3365500" y="1295400"/>
+                </a:cubicBezTo>
+                <a:cubicBezTo>
+                  <a:pt x="3357338" y="1336209"/>
+                  <a:pt x="3351648" y="1411428"/>
+                  <a:pt x="3327400" y="1447800"/>
+                </a:cubicBezTo>
+                <a:cubicBezTo>
+                  <a:pt x="3318933" y="1460500"/>
+                  <a:pt x="3312141" y="1474492"/>
+                  <a:pt x="3302000" y="1485900"/>
+                </a:cubicBezTo>
+                <a:cubicBezTo>
+                  <a:pt x="3278135" y="1512748"/>
+                  <a:pt x="3245725" y="1532212"/>
+                  <a:pt x="3225800" y="1562100"/>
+                </a:cubicBezTo>
+                <a:cubicBezTo>
+                  <a:pt x="3191933" y="1612900"/>
+                  <a:pt x="3213100" y="1591733"/>
+                  <a:pt x="3162300" y="1625600"/>
+                </a:cubicBezTo>
+                <a:lnTo>
+                  <a:pt x="3111500" y="1701800"/>
+                </a:lnTo>
+                <a:cubicBezTo>
+                  <a:pt x="3104074" y="1712939"/>
+                  <a:pt x="3106226" y="1728761"/>
+                  <a:pt x="3098800" y="1739900"/>
+                </a:cubicBezTo>
+                <a:cubicBezTo>
+                  <a:pt x="3088837" y="1754844"/>
+                  <a:pt x="3071727" y="1763823"/>
+                  <a:pt x="3060700" y="1778000"/>
+                </a:cubicBezTo>
+                <a:cubicBezTo>
+                  <a:pt x="3041958" y="1802097"/>
+                  <a:pt x="3026833" y="1828800"/>
+                  <a:pt x="3009900" y="1854200"/>
+                </a:cubicBezTo>
+                <a:cubicBezTo>
+                  <a:pt x="3001433" y="1866900"/>
+                  <a:pt x="2983208" y="1869459"/>
+                  <a:pt x="2971800" y="1879600"/>
+                </a:cubicBezTo>
+                <a:cubicBezTo>
+                  <a:pt x="2944952" y="1903465"/>
+                  <a:pt x="2895600" y="1955800"/>
+                  <a:pt x="2895600" y="1955800"/>
+                </a:cubicBezTo>
+                <a:cubicBezTo>
+                  <a:pt x="2871311" y="2028666"/>
+                  <a:pt x="2900294" y="1960651"/>
+                  <a:pt x="2844800" y="2032000"/>
+                </a:cubicBezTo>
+                <a:cubicBezTo>
+                  <a:pt x="2826058" y="2056097"/>
+                  <a:pt x="2810933" y="2082800"/>
+                  <a:pt x="2794000" y="2108200"/>
+                </a:cubicBezTo>
+                <a:cubicBezTo>
+                  <a:pt x="2785533" y="2120900"/>
+                  <a:pt x="2779393" y="2135507"/>
+                  <a:pt x="2768600" y="2146300"/>
+                </a:cubicBezTo>
+                <a:lnTo>
+                  <a:pt x="2730500" y="2184400"/>
+                </a:lnTo>
+                <a:cubicBezTo>
+                  <a:pt x="2708147" y="2251460"/>
+                  <a:pt x="2725226" y="2211361"/>
+                  <a:pt x="2667000" y="2298700"/>
+                </a:cubicBezTo>
+                <a:cubicBezTo>
+                  <a:pt x="2658533" y="2311400"/>
+                  <a:pt x="2646427" y="2322320"/>
+                  <a:pt x="2641600" y="2336800"/>
+                </a:cubicBezTo>
+                <a:lnTo>
+                  <a:pt x="2578100" y="2527300"/>
+                </a:lnTo>
+                <a:cubicBezTo>
+                  <a:pt x="2569962" y="2551715"/>
+                  <a:pt x="2564931" y="2591739"/>
+                  <a:pt x="2552700" y="2616200"/>
+                </a:cubicBezTo>
+                <a:cubicBezTo>
+                  <a:pt x="2550023" y="2621555"/>
+                  <a:pt x="2544233" y="2624667"/>
+                  <a:pt x="2540000" y="2628900"/>
+                </a:cubicBezTo>
+              </a:path>
+            </a:pathLst>
+          </a:custGeom>
+          <a:noFill/>
+        </p:spPr>
+        <p:style>
+          <a:lnRef idx="2">
+            <a:schemeClr val="accent1">
+              <a:shade val="50000"/>
+            </a:schemeClr>
+          </a:lnRef>
+          <a:fillRef idx="1">
+            <a:schemeClr val="accent1"/>
+          </a:fillRef>
+          <a:effectRef idx="0">
+            <a:schemeClr val="accent1"/>
+          </a:effectRef>
+          <a:fontRef idx="minor">
+            <a:schemeClr val="lt1"/>
+          </a:fontRef>
+        </p:style>
+        <p:txBody>
+          <a:bodyPr rtlCol="0" anchor="ctr"/>
+          <a:lstStyle/>
+          <a:p>
+            <a:pPr algn="ctr"/>
+            <a:endParaRPr lang="fr-FR"/>
+          </a:p>
+        </p:txBody>
+      </p:sp>
+      <p:cxnSp>
+        <p:nvCxnSpPr>
+          <p:cNvPr id="7" name="Connecteur droit 6"/>
+          <p:cNvCxnSpPr/>
+          <p:nvPr/>
+        </p:nvCxnSpPr>
+        <p:spPr>
+          <a:xfrm>
+            <a:off x="1763688" y="1916832"/>
+            <a:ext cx="4608512" cy="0"/>
+          </a:xfrm>
+          <a:prstGeom prst="line">
+            <a:avLst/>
+          </a:prstGeom>
+        </p:spPr>
+        <p:style>
+          <a:lnRef idx="1">
+            <a:schemeClr val="accent1"/>
+          </a:lnRef>
+          <a:fillRef idx="0">
+            <a:schemeClr val="accent1"/>
+          </a:fillRef>
+          <a:effectRef idx="0">
+            <a:schemeClr val="accent1"/>
+          </a:effectRef>
+          <a:fontRef idx="minor">
+            <a:schemeClr val="tx1"/>
+          </a:fontRef>
+        </p:style>
+      </p:cxnSp>
+      <p:cxnSp>
+        <p:nvCxnSpPr>
+          <p:cNvPr id="9" name="Connecteur droit 8"/>
+          <p:cNvCxnSpPr/>
+          <p:nvPr/>
+        </p:nvCxnSpPr>
+        <p:spPr>
+          <a:xfrm>
+            <a:off x="1907704" y="2636912"/>
+            <a:ext cx="4608512" cy="0"/>
+          </a:xfrm>
+          <a:prstGeom prst="line">
+            <a:avLst/>
+          </a:prstGeom>
+        </p:spPr>
+        <p:style>
+          <a:lnRef idx="1">
+            <a:schemeClr val="accent1"/>
+          </a:lnRef>
+          <a:fillRef idx="0">
+            <a:schemeClr val="accent1"/>
+          </a:fillRef>
+          <a:effectRef idx="0">
+            <a:schemeClr val="accent1"/>
+          </a:effectRef>
+          <a:fontRef idx="minor">
+            <a:schemeClr val="tx1"/>
+          </a:fontRef>
+        </p:style>
+      </p:cxnSp>
+      <p:cxnSp>
+        <p:nvCxnSpPr>
+          <p:cNvPr id="11" name="Connecteur droit 10"/>
+          <p:cNvCxnSpPr/>
+          <p:nvPr/>
+        </p:nvCxnSpPr>
+        <p:spPr>
+          <a:xfrm>
+            <a:off x="5436096" y="1163030"/>
+            <a:ext cx="0" cy="3960440"/>
+          </a:xfrm>
+          <a:prstGeom prst="line">
+            <a:avLst/>
+          </a:prstGeom>
+        </p:spPr>
+        <p:style>
+          <a:lnRef idx="1">
+            <a:schemeClr val="accent1"/>
+          </a:lnRef>
+          <a:fillRef idx="0">
+            <a:schemeClr val="accent1"/>
+          </a:fillRef>
+          <a:effectRef idx="0">
+            <a:schemeClr val="accent1"/>
+          </a:effectRef>
+          <a:fontRef idx="minor">
+            <a:schemeClr val="tx1"/>
+          </a:fontRef>
+        </p:style>
+      </p:cxnSp>
+      <p:sp>
+        <p:nvSpPr>
+          <p:cNvPr id="12" name="ZoneTexte 11"/>
+          <p:cNvSpPr txBox="1"/>
+          <p:nvPr/>
+        </p:nvSpPr>
+        <p:spPr>
+          <a:xfrm>
+            <a:off x="4752383" y="2185462"/>
+            <a:ext cx="408958" cy="369332"/>
+          </a:xfrm>
+          <a:prstGeom prst="rect">
+            <a:avLst/>
+          </a:prstGeom>
+          <a:noFill/>
+        </p:spPr>
+        <p:txBody>
+          <a:bodyPr wrap="none" rtlCol="0">
+            <a:spAutoFit/>
+          </a:bodyPr>
+          <a:lstStyle/>
+          <a:p>
+            <a:r>
+              <a:rPr lang="fr-FR" dirty="0" smtClean="0"/>
+              <a:t>Pa</a:t>
+            </a:r>
+            <a:endParaRPr lang="fr-FR" dirty="0"/>
+          </a:p>
+        </p:txBody>
+      </p:sp>
+      <p:sp>
+        <p:nvSpPr>
+          <p:cNvPr id="13" name="ZoneTexte 12"/>
+          <p:cNvSpPr txBox="1"/>
+          <p:nvPr/>
+        </p:nvSpPr>
+        <p:spPr>
+          <a:xfrm>
+            <a:off x="5980050" y="3367564"/>
+            <a:ext cx="425116" cy="369332"/>
+          </a:xfrm>
+          <a:prstGeom prst="rect">
+            <a:avLst/>
+          </a:prstGeom>
+          <a:noFill/>
+        </p:spPr>
+        <p:txBody>
+          <a:bodyPr wrap="none" rtlCol="0">
+            <a:spAutoFit/>
+          </a:bodyPr>
+          <a:lstStyle/>
+          <a:p>
+            <a:r>
+              <a:rPr lang="fr-FR" dirty="0" smtClean="0"/>
+              <a:t>Pb</a:t>
+            </a:r>
+            <a:endParaRPr lang="fr-FR" dirty="0"/>
+          </a:p>
+        </p:txBody>
+      </p:sp>
+      <p:cxnSp>
+        <p:nvCxnSpPr>
+          <p:cNvPr id="15" name="Connecteur droit avec flèche 14"/>
+          <p:cNvCxnSpPr/>
+          <p:nvPr/>
+        </p:nvCxnSpPr>
+        <p:spPr>
+          <a:xfrm flipH="1">
+            <a:off x="5131501" y="2156614"/>
+            <a:ext cx="277997" cy="213514"/>
+          </a:xfrm>
+          <a:prstGeom prst="straightConnector1">
+            <a:avLst/>
+          </a:prstGeom>
+          <a:ln>
+            <a:tailEnd type="arrow"/>
+          </a:ln>
+        </p:spPr>
+        <p:style>
+          <a:lnRef idx="1">
+            <a:schemeClr val="accent1"/>
+          </a:lnRef>
+          <a:fillRef idx="0">
+            <a:schemeClr val="accent1"/>
+          </a:fillRef>
+          <a:effectRef idx="0">
+            <a:schemeClr val="accent1"/>
+          </a:effectRef>
+          <a:fontRef idx="minor">
+            <a:schemeClr val="tx1"/>
+          </a:fontRef>
+        </p:style>
+      </p:cxnSp>
+      <p:cxnSp>
+        <p:nvCxnSpPr>
+          <p:cNvPr id="17" name="Connecteur droit avec flèche 16"/>
+          <p:cNvCxnSpPr/>
+          <p:nvPr/>
+        </p:nvCxnSpPr>
+        <p:spPr>
+          <a:xfrm>
+            <a:off x="5458169" y="3131066"/>
+            <a:ext cx="521881" cy="407432"/>
+          </a:xfrm>
+          <a:prstGeom prst="straightConnector1">
+            <a:avLst/>
+          </a:prstGeom>
+          <a:ln>
+            <a:tailEnd type="arrow"/>
+          </a:ln>
+        </p:spPr>
+        <p:style>
+          <a:lnRef idx="1">
+            <a:schemeClr val="accent1"/>
+          </a:lnRef>
+          <a:fillRef idx="0">
+            <a:schemeClr val="accent1"/>
+          </a:fillRef>
+          <a:effectRef idx="0">
+            <a:schemeClr val="accent1"/>
+          </a:effectRef>
+          <a:fontRef idx="minor">
+            <a:schemeClr val="tx1"/>
+          </a:fontRef>
+        </p:style>
+      </p:cxnSp>
+      <p:sp>
+        <p:nvSpPr>
+          <p:cNvPr id="20" name="ZoneTexte 19"/>
+          <p:cNvSpPr txBox="1"/>
+          <p:nvPr/>
+        </p:nvSpPr>
+        <p:spPr>
+          <a:xfrm>
+            <a:off x="5544140" y="5157192"/>
+            <a:ext cx="306494" cy="369332"/>
+          </a:xfrm>
+          <a:prstGeom prst="rect">
+            <a:avLst/>
+          </a:prstGeom>
+          <a:noFill/>
+        </p:spPr>
+        <p:txBody>
+          <a:bodyPr wrap="none" rtlCol="0">
+            <a:spAutoFit/>
+          </a:bodyPr>
+          <a:lstStyle/>
+          <a:p>
+            <a:r>
+              <a:rPr lang="fr-FR" dirty="0" smtClean="0"/>
+              <a:t>h</a:t>
+            </a:r>
+            <a:endParaRPr lang="fr-FR" dirty="0"/>
+          </a:p>
+        </p:txBody>
+      </p:sp>
+      <p:cxnSp>
+        <p:nvCxnSpPr>
+          <p:cNvPr id="24" name="Connecteur droit 23"/>
+          <p:cNvCxnSpPr/>
+          <p:nvPr/>
+        </p:nvCxnSpPr>
+        <p:spPr>
+          <a:xfrm flipH="1">
+            <a:off x="1380872" y="2147089"/>
+            <a:ext cx="4163268" cy="19050"/>
+          </a:xfrm>
+          <a:prstGeom prst="line">
+            <a:avLst/>
+          </a:prstGeom>
+        </p:spPr>
+        <p:style>
+          <a:lnRef idx="1">
+            <a:schemeClr val="accent1"/>
+          </a:lnRef>
+          <a:fillRef idx="0">
+            <a:schemeClr val="accent1"/>
+          </a:fillRef>
+          <a:effectRef idx="0">
+            <a:schemeClr val="accent1"/>
+          </a:effectRef>
+          <a:fontRef idx="minor">
+            <a:schemeClr val="tx1"/>
+          </a:fontRef>
+        </p:style>
+      </p:cxnSp>
+      <p:sp>
+        <p:nvSpPr>
+          <p:cNvPr id="25" name="ZoneTexte 24"/>
+          <p:cNvSpPr txBox="1"/>
+          <p:nvPr/>
+        </p:nvSpPr>
+        <p:spPr>
+          <a:xfrm>
+            <a:off x="3066307" y="2788682"/>
+            <a:ext cx="396199" cy="369332"/>
+          </a:xfrm>
+          <a:prstGeom prst="rect">
+            <a:avLst/>
+          </a:prstGeom>
+          <a:noFill/>
+        </p:spPr>
+        <p:txBody>
+          <a:bodyPr wrap="none" rtlCol="0">
+            <a:spAutoFit/>
+          </a:bodyPr>
+          <a:lstStyle/>
+          <a:p>
+            <a:r>
+              <a:rPr lang="fr-FR" dirty="0" smtClean="0"/>
+              <a:t>Pc</a:t>
+            </a:r>
+            <a:endParaRPr lang="fr-FR" dirty="0"/>
+          </a:p>
+        </p:txBody>
+      </p:sp>
+      <p:sp>
+        <p:nvSpPr>
+          <p:cNvPr id="26" name="Rectangle 25"/>
+          <p:cNvSpPr/>
+          <p:nvPr/>
+        </p:nvSpPr>
+        <p:spPr>
+          <a:xfrm>
+            <a:off x="2591935" y="1916832"/>
+            <a:ext cx="3388115" cy="720080"/>
+          </a:xfrm>
+          <a:prstGeom prst="rect">
+            <a:avLst/>
+          </a:prstGeom>
+          <a:solidFill>
+            <a:schemeClr val="accent1">
+              <a:alpha val="7000"/>
+            </a:schemeClr>
+          </a:solidFill>
+        </p:spPr>
+        <p:style>
+          <a:lnRef idx="1">
+            <a:schemeClr val="accent4"/>
+          </a:lnRef>
+          <a:fillRef idx="2">
+            <a:schemeClr val="accent4"/>
+          </a:fillRef>
+          <a:effectRef idx="1">
+            <a:schemeClr val="accent4"/>
+          </a:effectRef>
+          <a:fontRef idx="minor">
+            <a:schemeClr val="dk1"/>
+          </a:fontRef>
+        </p:style>
+        <p:txBody>
+          <a:bodyPr rtlCol="0" anchor="ctr"/>
+          <a:lstStyle/>
+          <a:p>
+            <a:pPr algn="ctr"/>
+            <a:endParaRPr lang="fr-FR"/>
+          </a:p>
+        </p:txBody>
+      </p:sp>
+      <p:sp>
+        <p:nvSpPr>
+          <p:cNvPr id="28" name="ZoneTexte 27"/>
+          <p:cNvSpPr txBox="1"/>
+          <p:nvPr/>
+        </p:nvSpPr>
+        <p:spPr>
+          <a:xfrm>
+            <a:off x="6307140" y="2078705"/>
+            <a:ext cx="819391" cy="369332"/>
+          </a:xfrm>
+          <a:prstGeom prst="rect">
+            <a:avLst/>
+          </a:prstGeom>
+          <a:noFill/>
+        </p:spPr>
+        <p:txBody>
+          <a:bodyPr wrap="none" rtlCol="0">
+            <a:spAutoFit/>
+          </a:bodyPr>
+          <a:lstStyle/>
+          <a:p>
+            <a:r>
+              <a:rPr lang="fr-FR" dirty="0" smtClean="0"/>
+              <a:t>Zone P</a:t>
+            </a:r>
+            <a:endParaRPr lang="fr-FR" dirty="0"/>
+          </a:p>
+        </p:txBody>
+      </p:sp>
+      <p:sp>
+        <p:nvSpPr>
+          <p:cNvPr id="29" name="ZoneTexte 28"/>
+          <p:cNvSpPr txBox="1"/>
+          <p:nvPr/>
+        </p:nvSpPr>
+        <p:spPr>
+          <a:xfrm>
+            <a:off x="395536" y="5526524"/>
+            <a:ext cx="8295989" cy="1200329"/>
+          </a:xfrm>
+          <a:prstGeom prst="rect">
+            <a:avLst/>
+          </a:prstGeom>
+          <a:noFill/>
+        </p:spPr>
+        <p:txBody>
+          <a:bodyPr wrap="none" rtlCol="0">
+            <a:spAutoFit/>
+          </a:bodyPr>
+          <a:lstStyle/>
+          <a:p>
+            <a:r>
+              <a:rPr lang="fr-FR" dirty="0" smtClean="0"/>
+              <a:t>To </a:t>
+            </a:r>
+            <a:r>
+              <a:rPr lang="fr-FR" dirty="0" err="1" smtClean="0"/>
+              <a:t>find</a:t>
+            </a:r>
+            <a:r>
+              <a:rPr lang="fr-FR" dirty="0" smtClean="0"/>
+              <a:t> Pa, </a:t>
+            </a:r>
+            <a:r>
+              <a:rPr lang="fr-FR" dirty="0" err="1" smtClean="0"/>
+              <a:t>we</a:t>
+            </a:r>
+            <a:r>
+              <a:rPr lang="fr-FR" dirty="0" smtClean="0"/>
+              <a:t> use the </a:t>
+            </a:r>
+            <a:r>
+              <a:rPr lang="fr-FR" dirty="0" err="1" smtClean="0"/>
+              <a:t>ZoneP</a:t>
+            </a:r>
+            <a:r>
+              <a:rPr lang="fr-FR" dirty="0" smtClean="0"/>
+              <a:t>, and to </a:t>
+            </a:r>
+            <a:r>
+              <a:rPr lang="fr-FR" dirty="0" err="1" smtClean="0"/>
+              <a:t>avoid</a:t>
+            </a:r>
+            <a:r>
+              <a:rPr lang="fr-FR" dirty="0" smtClean="0"/>
+              <a:t> </a:t>
+            </a:r>
+            <a:r>
+              <a:rPr lang="fr-FR" dirty="0" err="1" smtClean="0"/>
+              <a:t>that</a:t>
+            </a:r>
+            <a:r>
+              <a:rPr lang="fr-FR" dirty="0" smtClean="0"/>
+              <a:t> in the </a:t>
+            </a:r>
+            <a:r>
+              <a:rPr lang="fr-FR" dirty="0" err="1" smtClean="0"/>
+              <a:t>list</a:t>
+            </a:r>
+            <a:r>
+              <a:rPr lang="fr-FR" dirty="0" smtClean="0"/>
+              <a:t>, Pc </a:t>
+            </a:r>
+            <a:r>
+              <a:rPr lang="fr-FR" dirty="0" err="1" smtClean="0"/>
+              <a:t>could</a:t>
+            </a:r>
+            <a:r>
+              <a:rPr lang="fr-FR" dirty="0" smtClean="0"/>
+              <a:t> </a:t>
+            </a:r>
+            <a:r>
+              <a:rPr lang="fr-FR" dirty="0" err="1" smtClean="0"/>
+              <a:t>be</a:t>
+            </a:r>
+            <a:r>
+              <a:rPr lang="fr-FR" dirty="0" smtClean="0"/>
+              <a:t> </a:t>
+            </a:r>
+            <a:r>
+              <a:rPr lang="fr-FR" dirty="0" err="1" smtClean="0"/>
+              <a:t>choosed</a:t>
+            </a:r>
+            <a:r>
+              <a:rPr lang="fr-FR" dirty="0" smtClean="0"/>
+              <a:t>, h must </a:t>
+            </a:r>
+          </a:p>
+          <a:p>
+            <a:r>
+              <a:rPr lang="fr-FR" dirty="0" smtClean="0"/>
+              <a:t>Be in the </a:t>
+            </a:r>
+            <a:r>
+              <a:rPr lang="fr-FR" dirty="0" err="1" smtClean="0"/>
+              <a:t>limit</a:t>
+            </a:r>
+            <a:r>
+              <a:rPr lang="fr-FR" dirty="0" smtClean="0"/>
+              <a:t> of  Zone H </a:t>
+            </a:r>
+          </a:p>
+          <a:p>
+            <a:r>
+              <a:rPr lang="fr-FR" dirty="0" smtClean="0"/>
+              <a:t>This zone H </a:t>
+            </a:r>
+            <a:r>
+              <a:rPr lang="fr-FR" dirty="0" err="1" smtClean="0"/>
+              <a:t>is</a:t>
+            </a:r>
+            <a:r>
+              <a:rPr lang="fr-FR" dirty="0" smtClean="0"/>
+              <a:t> </a:t>
+            </a:r>
+            <a:r>
+              <a:rPr lang="fr-FR" dirty="0" err="1" smtClean="0"/>
+              <a:t>checked</a:t>
+            </a:r>
+            <a:r>
+              <a:rPr lang="fr-FR" dirty="0" smtClean="0"/>
+              <a:t> by the </a:t>
+            </a:r>
+            <a:r>
+              <a:rPr lang="fr-FR" dirty="0" err="1" smtClean="0"/>
+              <a:t>element</a:t>
+            </a:r>
+            <a:r>
+              <a:rPr lang="fr-FR" dirty="0" smtClean="0"/>
+              <a:t> </a:t>
+            </a:r>
+            <a:r>
+              <a:rPr lang="fr-FR" dirty="0" err="1" smtClean="0"/>
+              <a:t>found</a:t>
+            </a:r>
+            <a:r>
+              <a:rPr lang="fr-FR" dirty="0" smtClean="0"/>
+              <a:t> in the </a:t>
+            </a:r>
+            <a:r>
+              <a:rPr lang="fr-FR" dirty="0" err="1" smtClean="0"/>
+              <a:t>list</a:t>
+            </a:r>
+            <a:r>
+              <a:rPr lang="fr-FR" dirty="0" smtClean="0"/>
+              <a:t> : x0 and x1</a:t>
+            </a:r>
+            <a:endParaRPr lang="fr-FR" dirty="0"/>
+          </a:p>
+          <a:p>
+            <a:r>
+              <a:rPr lang="fr-FR" dirty="0" smtClean="0"/>
+              <a:t>Out of </a:t>
+            </a:r>
+            <a:r>
+              <a:rPr lang="fr-FR" dirty="0" err="1" smtClean="0"/>
+              <a:t>this</a:t>
+            </a:r>
+            <a:r>
+              <a:rPr lang="fr-FR" dirty="0" smtClean="0"/>
+              <a:t> zone, no value </a:t>
+            </a:r>
+            <a:r>
+              <a:rPr lang="fr-FR" dirty="0" err="1" smtClean="0"/>
+              <a:t>will</a:t>
+            </a:r>
+            <a:r>
+              <a:rPr lang="fr-FR" dirty="0" smtClean="0"/>
+              <a:t> </a:t>
+            </a:r>
+            <a:r>
+              <a:rPr lang="fr-FR" dirty="0" err="1" smtClean="0"/>
+              <a:t>be</a:t>
+            </a:r>
+            <a:r>
+              <a:rPr lang="fr-FR" dirty="0" smtClean="0"/>
+              <a:t> </a:t>
+            </a:r>
+            <a:r>
+              <a:rPr lang="fr-FR" dirty="0" err="1" smtClean="0"/>
+              <a:t>returned</a:t>
+            </a:r>
+            <a:r>
+              <a:rPr lang="fr-FR" dirty="0" smtClean="0"/>
+              <a:t> !!</a:t>
+            </a:r>
+            <a:endParaRPr lang="fr-FR" dirty="0"/>
+          </a:p>
+        </p:txBody>
+      </p:sp>
+      <p:cxnSp>
+        <p:nvCxnSpPr>
+          <p:cNvPr id="31" name="Connecteur droit avec flèche 30"/>
+          <p:cNvCxnSpPr>
+            <a:endCxn id="25" idx="0"/>
+          </p:cNvCxnSpPr>
+          <p:nvPr/>
+        </p:nvCxnSpPr>
+        <p:spPr>
+          <a:xfrm>
+            <a:off x="3264406" y="2185462"/>
+            <a:ext cx="1" cy="603220"/>
+          </a:xfrm>
+          <a:prstGeom prst="straightConnector1">
+            <a:avLst/>
+          </a:prstGeom>
+          <a:ln>
+            <a:tailEnd type="arrow"/>
+          </a:ln>
+        </p:spPr>
+        <p:style>
+          <a:lnRef idx="1">
+            <a:schemeClr val="accent1"/>
+          </a:lnRef>
+          <a:fillRef idx="0">
+            <a:schemeClr val="accent1"/>
+          </a:fillRef>
+          <a:effectRef idx="0">
+            <a:schemeClr val="accent1"/>
+          </a:effectRef>
+          <a:fontRef idx="minor">
+            <a:schemeClr val="tx1"/>
+          </a:fontRef>
+        </p:style>
+      </p:cxnSp>
+      <p:sp>
+        <p:nvSpPr>
+          <p:cNvPr id="32" name="Rectangle 31"/>
+          <p:cNvSpPr/>
+          <p:nvPr/>
+        </p:nvSpPr>
+        <p:spPr>
+          <a:xfrm>
+            <a:off x="5091449" y="1349849"/>
+            <a:ext cx="689293" cy="1632580"/>
+          </a:xfrm>
+          <a:prstGeom prst="rect">
+            <a:avLst/>
+          </a:prstGeom>
+          <a:solidFill>
+            <a:schemeClr val="accent3">
+              <a:lumMod val="60000"/>
+              <a:lumOff val="40000"/>
+              <a:alpha val="37000"/>
+            </a:schemeClr>
+          </a:solidFill>
+        </p:spPr>
+        <p:style>
+          <a:lnRef idx="2">
+            <a:schemeClr val="accent1">
+              <a:shade val="50000"/>
+            </a:schemeClr>
+          </a:lnRef>
+          <a:fillRef idx="1">
+            <a:schemeClr val="accent1"/>
+          </a:fillRef>
+          <a:effectRef idx="0">
+            <a:schemeClr val="accent1"/>
+          </a:effectRef>
+          <a:fontRef idx="minor">
+            <a:schemeClr val="lt1"/>
+          </a:fontRef>
+        </p:style>
+        <p:txBody>
+          <a:bodyPr rtlCol="0" anchor="ctr"/>
+          <a:lstStyle/>
+          <a:p>
+            <a:pPr algn="ctr"/>
+            <a:endParaRPr lang="fr-FR"/>
+          </a:p>
+        </p:txBody>
+      </p:sp>
+      <p:sp>
+        <p:nvSpPr>
+          <p:cNvPr id="33" name="ZoneTexte 32"/>
+          <p:cNvSpPr txBox="1"/>
+          <p:nvPr/>
+        </p:nvSpPr>
+        <p:spPr>
+          <a:xfrm>
+            <a:off x="4992134" y="620688"/>
+            <a:ext cx="845040" cy="369332"/>
+          </a:xfrm>
+          <a:prstGeom prst="rect">
+            <a:avLst/>
+          </a:prstGeom>
+          <a:noFill/>
+        </p:spPr>
+        <p:txBody>
+          <a:bodyPr wrap="none" rtlCol="0">
+            <a:spAutoFit/>
+          </a:bodyPr>
+          <a:lstStyle/>
+          <a:p>
+            <a:r>
+              <a:rPr lang="fr-FR" dirty="0" smtClean="0"/>
+              <a:t>Zone H</a:t>
+            </a:r>
+            <a:endParaRPr lang="fr-FR" dirty="0"/>
+          </a:p>
+        </p:txBody>
+      </p:sp>
+      <p:sp>
+        <p:nvSpPr>
+          <p:cNvPr id="34" name="ZoneTexte 33"/>
+          <p:cNvSpPr txBox="1"/>
+          <p:nvPr/>
+        </p:nvSpPr>
+        <p:spPr>
+          <a:xfrm>
+            <a:off x="568430" y="436022"/>
+            <a:ext cx="4161332" cy="646331"/>
+          </a:xfrm>
+          <a:prstGeom prst="rect">
+            <a:avLst/>
+          </a:prstGeom>
+          <a:noFill/>
+        </p:spPr>
+        <p:txBody>
+          <a:bodyPr wrap="none" rtlCol="0">
+            <a:spAutoFit/>
+          </a:bodyPr>
+          <a:lstStyle/>
+          <a:p>
+            <a:r>
+              <a:rPr lang="fr-FR" dirty="0" err="1" smtClean="0"/>
+              <a:t>Principle</a:t>
+            </a:r>
+            <a:r>
+              <a:rPr lang="fr-FR" dirty="0" smtClean="0"/>
+              <a:t> to </a:t>
+            </a:r>
+            <a:r>
+              <a:rPr lang="fr-FR" dirty="0" err="1" smtClean="0"/>
+              <a:t>compute</a:t>
+            </a:r>
+            <a:r>
+              <a:rPr lang="fr-FR" dirty="0" smtClean="0"/>
+              <a:t> the </a:t>
+            </a:r>
+            <a:r>
+              <a:rPr lang="fr-FR" dirty="0" err="1" smtClean="0"/>
+              <a:t>satured</a:t>
+            </a:r>
+            <a:r>
+              <a:rPr lang="fr-FR" dirty="0" smtClean="0"/>
+              <a:t> Pression </a:t>
+            </a:r>
+          </a:p>
+          <a:p>
+            <a:r>
+              <a:rPr lang="fr-FR" dirty="0" smtClean="0"/>
+              <a:t>for a H value</a:t>
+            </a:r>
+            <a:endParaRPr lang="fr-FR" dirty="0"/>
+          </a:p>
+        </p:txBody>
+      </p:sp>
+    </p:spTree>
+    <p:extLst>
+      <p:ext uri="{BB962C8B-B14F-4D97-AF65-F5344CB8AC3E}">
+        <p14:creationId xmlns:p14="http://schemas.microsoft.com/office/powerpoint/2010/main" val="3436879399"/>
       </p:ext>
     </p:extLst>
   </p:cSld>

</xml_diff>